<commit_message>
This doesn't do everything, but you can turn friction on and off.
</commit_message>
<xml_diff>
--- a/papers/ICRA2016/pictures/pdf/experiment.pptx
+++ b/papers/ICRA2016/pictures/pdf/experiment.pptx
@@ -3487,7 +3487,7 @@
           <p:nvPr/>
         </p:nvPicPr>
         <p:blipFill>
-          <a:blip r:embed="rId3" cstate="print">
+          <a:blip r:embed="rId3" cstate="email">
             <a:extLst>
               <a:ext uri="{28A0092B-C50C-407E-A947-70E740481C1C}">
                 <a14:useLocalDpi xmlns:a14="http://schemas.microsoft.com/office/drawing/2010/main"/>
@@ -3517,7 +3517,7 @@
           <p:nvPr/>
         </p:nvPicPr>
         <p:blipFill>
-          <a:blip r:embed="rId4" cstate="print">
+          <a:blip r:embed="rId4" cstate="email">
             <a:extLst>
               <a:ext uri="{28A0092B-C50C-407E-A947-70E740481C1C}">
                 <a14:useLocalDpi xmlns:a14="http://schemas.microsoft.com/office/drawing/2010/main"/>
@@ -3547,7 +3547,7 @@
           <p:nvPr/>
         </p:nvPicPr>
         <p:blipFill>
-          <a:blip r:embed="rId5" cstate="print">
+          <a:blip r:embed="rId5" cstate="email">
             <a:extLst>
               <a:ext uri="{28A0092B-C50C-407E-A947-70E740481C1C}">
                 <a14:useLocalDpi xmlns:a14="http://schemas.microsoft.com/office/drawing/2010/main"/>
@@ -3577,7 +3577,7 @@
           <p:nvPr/>
         </p:nvPicPr>
         <p:blipFill>
-          <a:blip r:embed="rId6" cstate="print">
+          <a:blip r:embed="rId6" cstate="email">
             <a:extLst>
               <a:ext uri="{28A0092B-C50C-407E-A947-70E740481C1C}">
                 <a14:useLocalDpi xmlns:a14="http://schemas.microsoft.com/office/drawing/2010/main"/>

</xml_diff>